<commit_message>
Update PPTX template with compliant branding
</commit_message>
<xml_diff>
--- a/.assets/template.pptx
+++ b/.assets/template.pptx
@@ -147,10 +147,10 @@
       </p:grpSpPr>
       <p:grpSp>
         <p:nvGrpSpPr>
-          <p:cNvPr id="21" name="Background">
+          <p:cNvPr id="20" name="Geometry">
             <a:extLst>
               <a:ext uri="{FF2B5EF4-FFF2-40B4-BE49-F238E27FC236}">
-                <a16:creationId xmlns:a16="http://schemas.microsoft.com/office/drawing/2014/main" id="{8C8262D6-A8A0-4E0D-A458-02086C99A36D}"/>
+                <a16:creationId xmlns:a16="http://schemas.microsoft.com/office/drawing/2014/main" id="{B3AA8525-9932-415C-A770-7A0D36403C24}"/>
               </a:ext>
             </a:extLst>
           </p:cNvPr>
@@ -159,1060 +159,663 @@
         </p:nvGrpSpPr>
         <p:grpSpPr>
           <a:xfrm>
-            <a:off x="457200" y="0"/>
-            <a:ext cx="11734801" cy="6013450"/>
-            <a:chOff x="457200" y="0"/>
-            <a:chExt cx="11734801" cy="6013450"/>
+            <a:off x="5776913" y="0"/>
+            <a:ext cx="6415088" cy="6013450"/>
+            <a:chOff x="5776913" y="0"/>
+            <a:chExt cx="6415088" cy="6013450"/>
           </a:xfrm>
         </p:grpSpPr>
-        <p:grpSp>
-          <p:nvGrpSpPr>
-            <p:cNvPr id="4" name="Microsoft Logo">
+        <p:sp>
+          <p:nvSpPr>
+            <p:cNvPr id="12" name="Freeform 5">
               <a:extLst>
                 <a:ext uri="{FF2B5EF4-FFF2-40B4-BE49-F238E27FC236}">
-                  <a16:creationId xmlns:a16="http://schemas.microsoft.com/office/drawing/2014/main" id="{7A2E9D9F-6007-4D09-8838-5F0698AEF4A3}"/>
+                  <a16:creationId xmlns:a16="http://schemas.microsoft.com/office/drawing/2014/main" id="{C73B88AE-70DB-49CE-9A3C-00E2F9CFDB9E}"/>
                 </a:ext>
               </a:extLst>
             </p:cNvPr>
-            <p:cNvGrpSpPr/>
-            <p:nvPr/>
-          </p:nvGrpSpPr>
-          <p:grpSpPr>
+            <p:cNvSpPr>
+              <a:spLocks/>
+            </p:cNvSpPr>
+            <p:nvPr userDrawn="1"/>
+          </p:nvSpPr>
+          <p:spPr bwMode="auto">
             <a:xfrm>
-              <a:off x="457200" y="463327"/>
-              <a:ext cx="365760" cy="365760"/>
-              <a:chOff x="457200" y="463327"/>
-              <a:chExt cx="365760" cy="365760"/>
+              <a:off x="5776913" y="1481138"/>
+              <a:ext cx="2438400" cy="2274888"/>
             </a:xfrm>
-          </p:grpSpPr>
-          <p:sp>
-            <p:nvSpPr>
-              <p:cNvPr id="5" name="Red">
-                <a:extLst>
-                  <a:ext uri="{FF2B5EF4-FFF2-40B4-BE49-F238E27FC236}">
-                    <a16:creationId xmlns:a16="http://schemas.microsoft.com/office/drawing/2014/main" id="{36466782-B63B-4CB7-B4F3-0A80597799CB}"/>
-                  </a:ext>
-                </a:extLst>
-              </p:cNvPr>
-              <p:cNvSpPr/>
-              <p:nvPr/>
-            </p:nvSpPr>
-            <p:spPr>
-              <a:xfrm>
-                <a:off x="466344" y="472471"/>
-                <a:ext cx="165116" cy="165116"/>
-              </a:xfrm>
-              <a:custGeom>
+            <a:custGeom>
+              <a:avLst/>
+              <a:gdLst>
+                <a:gd name="T0" fmla="*/ 0 w 2675"/>
+                <a:gd name="T1" fmla="*/ 2498 h 2498"/>
+                <a:gd name="T2" fmla="*/ 0 w 2675"/>
+                <a:gd name="T3" fmla="*/ 2498 h 2498"/>
+                <a:gd name="T4" fmla="*/ 2675 w 2675"/>
+                <a:gd name="T5" fmla="*/ 2156 h 2498"/>
+                <a:gd name="T6" fmla="*/ 1054 w 2675"/>
+                <a:gd name="T7" fmla="*/ 0 h 2498"/>
+                <a:gd name="T8" fmla="*/ 0 w 2675"/>
+                <a:gd name="T9" fmla="*/ 2498 h 2498"/>
+              </a:gdLst>
+              <a:ahLst/>
+              <a:cxnLst>
+                <a:cxn ang="0">
+                  <a:pos x="T0" y="T1"/>
+                </a:cxn>
+                <a:cxn ang="0">
+                  <a:pos x="T2" y="T3"/>
+                </a:cxn>
+                <a:cxn ang="0">
+                  <a:pos x="T4" y="T5"/>
+                </a:cxn>
+                <a:cxn ang="0">
+                  <a:pos x="T6" y="T7"/>
+                </a:cxn>
+                <a:cxn ang="0">
+                  <a:pos x="T8" y="T9"/>
+                </a:cxn>
+              </a:cxnLst>
+              <a:rect l="0" t="0" r="r" b="b"/>
+              <a:pathLst>
+                <a:path w="2675" h="2498">
+                  <a:moveTo>
+                    <a:pt x="0" y="2498"/>
+                  </a:moveTo>
+                  <a:lnTo>
+                    <a:pt x="0" y="2498"/>
+                  </a:lnTo>
+                  <a:lnTo>
+                    <a:pt x="2675" y="2156"/>
+                  </a:lnTo>
+                  <a:lnTo>
+                    <a:pt x="1054" y="0"/>
+                  </a:lnTo>
+                  <a:lnTo>
+                    <a:pt x="0" y="2498"/>
+                  </a:lnTo>
+                  <a:close/>
+                </a:path>
+              </a:pathLst>
+            </a:custGeom>
+            <a:solidFill>
+              <a:srgbClr val="D4D5D5"/>
+            </a:solidFill>
+            <a:ln w="0">
+              <a:noFill/>
+              <a:prstDash val="solid"/>
+              <a:round/>
+              <a:headEnd/>
+              <a:tailEnd/>
+            </a:ln>
+          </p:spPr>
+          <p:txBody>
+            <a:bodyPr vert="horz" wrap="square" lIns="91440" tIns="45720" rIns="91440" bIns="45720" numCol="1" anchor="t" anchorCtr="0" compatLnSpc="1">
+              <a:prstTxWarp prst="textNoShape">
                 <a:avLst/>
-                <a:gdLst>
-                  <a:gd name="connsiteX0" fmla="*/ 0 w 165116"/>
-                  <a:gd name="connsiteY0" fmla="*/ 0 h 165116"/>
-                  <a:gd name="connsiteX1" fmla="*/ 165117 w 165116"/>
-                  <a:gd name="connsiteY1" fmla="*/ 0 h 165116"/>
-                  <a:gd name="connsiteX2" fmla="*/ 165117 w 165116"/>
-                  <a:gd name="connsiteY2" fmla="*/ 165117 h 165116"/>
-                  <a:gd name="connsiteX3" fmla="*/ 0 w 165116"/>
-                  <a:gd name="connsiteY3" fmla="*/ 165117 h 165116"/>
-                </a:gdLst>
-                <a:ahLst/>
-                <a:cxnLst>
-                  <a:cxn ang="0">
-                    <a:pos x="connsiteX0" y="connsiteY0"/>
-                  </a:cxn>
-                  <a:cxn ang="0">
-                    <a:pos x="connsiteX1" y="connsiteY1"/>
-                  </a:cxn>
-                  <a:cxn ang="0">
-                    <a:pos x="connsiteX2" y="connsiteY2"/>
-                  </a:cxn>
-                  <a:cxn ang="0">
-                    <a:pos x="connsiteX3" y="connsiteY3"/>
-                  </a:cxn>
-                </a:cxnLst>
-                <a:rect l="l" t="t" r="r" b="b"/>
-                <a:pathLst>
-                  <a:path w="165116" h="165116">
-                    <a:moveTo>
-                      <a:pt x="0" y="0"/>
-                    </a:moveTo>
-                    <a:lnTo>
-                      <a:pt x="165117" y="0"/>
-                    </a:lnTo>
-                    <a:lnTo>
-                      <a:pt x="165117" y="165117"/>
-                    </a:lnTo>
-                    <a:lnTo>
-                      <a:pt x="0" y="165117"/>
-                    </a:lnTo>
-                    <a:close/>
-                  </a:path>
-                </a:pathLst>
-              </a:custGeom>
-              <a:solidFill>
-                <a:srgbClr val="F25022"/>
-              </a:solidFill>
-              <a:ln w="2666" cap="flat">
-                <a:noFill/>
-                <a:prstDash val="solid"/>
-                <a:miter/>
-              </a:ln>
-            </p:spPr>
-            <p:txBody>
-              <a:bodyPr rtlCol="0" anchor="ctr"/>
-              <a:lstStyle/>
-              <a:p>
-                <a:endParaRPr lang="en-US"/>
-              </a:p>
-            </p:txBody>
-          </p:sp>
-          <p:sp>
-            <p:nvSpPr>
-              <p:cNvPr id="6" name="Green">
-                <a:extLst>
-                  <a:ext uri="{FF2B5EF4-FFF2-40B4-BE49-F238E27FC236}">
-                    <a16:creationId xmlns:a16="http://schemas.microsoft.com/office/drawing/2014/main" id="{4E930D80-F690-47F5-AEDB-B0EB7116938F}"/>
-                  </a:ext>
-                </a:extLst>
-              </p:cNvPr>
-              <p:cNvSpPr/>
-              <p:nvPr/>
-            </p:nvSpPr>
-            <p:spPr>
-              <a:xfrm>
-                <a:off x="648699" y="472471"/>
-                <a:ext cx="165116" cy="165116"/>
-              </a:xfrm>
-              <a:custGeom>
-                <a:avLst/>
-                <a:gdLst>
-                  <a:gd name="connsiteX0" fmla="*/ 0 w 165116"/>
-                  <a:gd name="connsiteY0" fmla="*/ 0 h 165116"/>
-                  <a:gd name="connsiteX1" fmla="*/ 165117 w 165116"/>
-                  <a:gd name="connsiteY1" fmla="*/ 0 h 165116"/>
-                  <a:gd name="connsiteX2" fmla="*/ 165117 w 165116"/>
-                  <a:gd name="connsiteY2" fmla="*/ 165117 h 165116"/>
-                  <a:gd name="connsiteX3" fmla="*/ 0 w 165116"/>
-                  <a:gd name="connsiteY3" fmla="*/ 165117 h 165116"/>
-                </a:gdLst>
-                <a:ahLst/>
-                <a:cxnLst>
-                  <a:cxn ang="0">
-                    <a:pos x="connsiteX0" y="connsiteY0"/>
-                  </a:cxn>
-                  <a:cxn ang="0">
-                    <a:pos x="connsiteX1" y="connsiteY1"/>
-                  </a:cxn>
-                  <a:cxn ang="0">
-                    <a:pos x="connsiteX2" y="connsiteY2"/>
-                  </a:cxn>
-                  <a:cxn ang="0">
-                    <a:pos x="connsiteX3" y="connsiteY3"/>
-                  </a:cxn>
-                </a:cxnLst>
-                <a:rect l="l" t="t" r="r" b="b"/>
-                <a:pathLst>
-                  <a:path w="165116" h="165116">
-                    <a:moveTo>
-                      <a:pt x="0" y="0"/>
-                    </a:moveTo>
-                    <a:lnTo>
-                      <a:pt x="165117" y="0"/>
-                    </a:lnTo>
-                    <a:lnTo>
-                      <a:pt x="165117" y="165117"/>
-                    </a:lnTo>
-                    <a:lnTo>
-                      <a:pt x="0" y="165117"/>
-                    </a:lnTo>
-                    <a:close/>
-                  </a:path>
-                </a:pathLst>
-              </a:custGeom>
-              <a:solidFill>
-                <a:srgbClr val="7FBA00"/>
-              </a:solidFill>
-              <a:ln w="2666" cap="flat">
-                <a:noFill/>
-                <a:prstDash val="solid"/>
-                <a:miter/>
-              </a:ln>
-            </p:spPr>
-            <p:txBody>
-              <a:bodyPr rtlCol="0" anchor="ctr"/>
-              <a:lstStyle/>
-              <a:p>
-                <a:endParaRPr lang="en-US"/>
-              </a:p>
-            </p:txBody>
-          </p:sp>
-          <p:sp>
-            <p:nvSpPr>
-              <p:cNvPr id="8" name="Blue">
-                <a:extLst>
-                  <a:ext uri="{FF2B5EF4-FFF2-40B4-BE49-F238E27FC236}">
-                    <a16:creationId xmlns:a16="http://schemas.microsoft.com/office/drawing/2014/main" id="{5DF4B9D0-9757-4A7A-98C1-AC0DA51E6C26}"/>
-                  </a:ext>
-                </a:extLst>
-              </p:cNvPr>
-              <p:cNvSpPr/>
-              <p:nvPr/>
-            </p:nvSpPr>
-            <p:spPr>
-              <a:xfrm>
-                <a:off x="466344" y="654826"/>
-                <a:ext cx="165116" cy="165116"/>
-              </a:xfrm>
-              <a:custGeom>
-                <a:avLst/>
-                <a:gdLst>
-                  <a:gd name="connsiteX0" fmla="*/ 0 w 165116"/>
-                  <a:gd name="connsiteY0" fmla="*/ 0 h 165116"/>
-                  <a:gd name="connsiteX1" fmla="*/ 165117 w 165116"/>
-                  <a:gd name="connsiteY1" fmla="*/ 0 h 165116"/>
-                  <a:gd name="connsiteX2" fmla="*/ 165117 w 165116"/>
-                  <a:gd name="connsiteY2" fmla="*/ 165117 h 165116"/>
-                  <a:gd name="connsiteX3" fmla="*/ 0 w 165116"/>
-                  <a:gd name="connsiteY3" fmla="*/ 165117 h 165116"/>
-                </a:gdLst>
-                <a:ahLst/>
-                <a:cxnLst>
-                  <a:cxn ang="0">
-                    <a:pos x="connsiteX0" y="connsiteY0"/>
-                  </a:cxn>
-                  <a:cxn ang="0">
-                    <a:pos x="connsiteX1" y="connsiteY1"/>
-                  </a:cxn>
-                  <a:cxn ang="0">
-                    <a:pos x="connsiteX2" y="connsiteY2"/>
-                  </a:cxn>
-                  <a:cxn ang="0">
-                    <a:pos x="connsiteX3" y="connsiteY3"/>
-                  </a:cxn>
-                </a:cxnLst>
-                <a:rect l="l" t="t" r="r" b="b"/>
-                <a:pathLst>
-                  <a:path w="165116" h="165116">
-                    <a:moveTo>
-                      <a:pt x="0" y="0"/>
-                    </a:moveTo>
-                    <a:lnTo>
-                      <a:pt x="165117" y="0"/>
-                    </a:lnTo>
-                    <a:lnTo>
-                      <a:pt x="165117" y="165117"/>
-                    </a:lnTo>
-                    <a:lnTo>
-                      <a:pt x="0" y="165117"/>
-                    </a:lnTo>
-                    <a:close/>
-                  </a:path>
-                </a:pathLst>
-              </a:custGeom>
-              <a:solidFill>
-                <a:srgbClr val="00A4EF"/>
-              </a:solidFill>
-              <a:ln w="2666" cap="flat">
-                <a:noFill/>
-                <a:prstDash val="solid"/>
-                <a:miter/>
-              </a:ln>
-            </p:spPr>
-            <p:txBody>
-              <a:bodyPr rtlCol="0" anchor="ctr"/>
-              <a:lstStyle/>
-              <a:p>
-                <a:endParaRPr lang="en-US"/>
-              </a:p>
-            </p:txBody>
-          </p:sp>
-          <p:sp>
-            <p:nvSpPr>
-              <p:cNvPr id="9" name="Yellow">
-                <a:extLst>
-                  <a:ext uri="{FF2B5EF4-FFF2-40B4-BE49-F238E27FC236}">
-                    <a16:creationId xmlns:a16="http://schemas.microsoft.com/office/drawing/2014/main" id="{A2DBD94A-546C-45BA-98BD-2AC246826FE3}"/>
-                  </a:ext>
-                </a:extLst>
-              </p:cNvPr>
-              <p:cNvSpPr/>
-              <p:nvPr/>
-            </p:nvSpPr>
-            <p:spPr>
-              <a:xfrm>
-                <a:off x="648699" y="654826"/>
-                <a:ext cx="165116" cy="165116"/>
-              </a:xfrm>
-              <a:custGeom>
-                <a:avLst/>
-                <a:gdLst>
-                  <a:gd name="connsiteX0" fmla="*/ 0 w 165116"/>
-                  <a:gd name="connsiteY0" fmla="*/ 0 h 165116"/>
-                  <a:gd name="connsiteX1" fmla="*/ 165117 w 165116"/>
-                  <a:gd name="connsiteY1" fmla="*/ 0 h 165116"/>
-                  <a:gd name="connsiteX2" fmla="*/ 165117 w 165116"/>
-                  <a:gd name="connsiteY2" fmla="*/ 165117 h 165116"/>
-                  <a:gd name="connsiteX3" fmla="*/ 0 w 165116"/>
-                  <a:gd name="connsiteY3" fmla="*/ 165117 h 165116"/>
-                </a:gdLst>
-                <a:ahLst/>
-                <a:cxnLst>
-                  <a:cxn ang="0">
-                    <a:pos x="connsiteX0" y="connsiteY0"/>
-                  </a:cxn>
-                  <a:cxn ang="0">
-                    <a:pos x="connsiteX1" y="connsiteY1"/>
-                  </a:cxn>
-                  <a:cxn ang="0">
-                    <a:pos x="connsiteX2" y="connsiteY2"/>
-                  </a:cxn>
-                  <a:cxn ang="0">
-                    <a:pos x="connsiteX3" y="connsiteY3"/>
-                  </a:cxn>
-                </a:cxnLst>
-                <a:rect l="l" t="t" r="r" b="b"/>
-                <a:pathLst>
-                  <a:path w="165116" h="165116">
-                    <a:moveTo>
-                      <a:pt x="0" y="0"/>
-                    </a:moveTo>
-                    <a:lnTo>
-                      <a:pt x="165117" y="0"/>
-                    </a:lnTo>
-                    <a:lnTo>
-                      <a:pt x="165117" y="165117"/>
-                    </a:lnTo>
-                    <a:lnTo>
-                      <a:pt x="0" y="165117"/>
-                    </a:lnTo>
-                    <a:close/>
-                  </a:path>
-                </a:pathLst>
-              </a:custGeom>
-              <a:solidFill>
-                <a:srgbClr val="FFB900"/>
-              </a:solidFill>
-              <a:ln w="2666" cap="flat">
-                <a:noFill/>
-                <a:prstDash val="solid"/>
-                <a:miter/>
-              </a:ln>
-            </p:spPr>
-            <p:txBody>
-              <a:bodyPr rtlCol="0" anchor="ctr"/>
-              <a:lstStyle/>
-              <a:p>
-                <a:endParaRPr lang="en-US"/>
-              </a:p>
-            </p:txBody>
-          </p:sp>
-        </p:grpSp>
-        <p:grpSp>
-          <p:nvGrpSpPr>
-            <p:cNvPr id="20" name="Geometry">
+              </a:prstTxWarp>
+            </a:bodyPr>
+            <a:lstStyle/>
+            <a:p>
+              <a:endParaRPr lang="en-US"/>
+            </a:p>
+          </p:txBody>
+        </p:sp>
+        <p:sp>
+          <p:nvSpPr>
+            <p:cNvPr id="13" name="Freeform 6">
               <a:extLst>
                 <a:ext uri="{FF2B5EF4-FFF2-40B4-BE49-F238E27FC236}">
-                  <a16:creationId xmlns:a16="http://schemas.microsoft.com/office/drawing/2014/main" id="{B3AA8525-9932-415C-A770-7A0D36403C24}"/>
+                  <a16:creationId xmlns:a16="http://schemas.microsoft.com/office/drawing/2014/main" id="{F3DE9D65-7E4E-418B-8573-F27D313DCD5D}"/>
                 </a:ext>
               </a:extLst>
             </p:cNvPr>
-            <p:cNvGrpSpPr/>
+            <p:cNvSpPr>
+              <a:spLocks/>
+            </p:cNvSpPr>
             <p:nvPr userDrawn="1"/>
-          </p:nvGrpSpPr>
-          <p:grpSpPr>
+          </p:nvSpPr>
+          <p:spPr bwMode="auto">
             <a:xfrm>
-              <a:off x="5776913" y="0"/>
-              <a:ext cx="6415088" cy="6013450"/>
-              <a:chOff x="5776913" y="0"/>
-              <a:chExt cx="6415088" cy="6013450"/>
+              <a:off x="8215313" y="0"/>
+              <a:ext cx="3976688" cy="3444875"/>
             </a:xfrm>
-          </p:grpSpPr>
-          <p:sp>
-            <p:nvSpPr>
-              <p:cNvPr id="12" name="Freeform 5">
-                <a:extLst>
-                  <a:ext uri="{FF2B5EF4-FFF2-40B4-BE49-F238E27FC236}">
-                    <a16:creationId xmlns:a16="http://schemas.microsoft.com/office/drawing/2014/main" id="{C73B88AE-70DB-49CE-9A3C-00E2F9CFDB9E}"/>
-                  </a:ext>
-                </a:extLst>
-              </p:cNvPr>
-              <p:cNvSpPr>
-                <a:spLocks/>
-              </p:cNvSpPr>
-              <p:nvPr userDrawn="1"/>
-            </p:nvSpPr>
-            <p:spPr bwMode="auto">
-              <a:xfrm>
-                <a:off x="5776913" y="1481138"/>
-                <a:ext cx="2438400" cy="2274888"/>
-              </a:xfrm>
-              <a:custGeom>
+            <a:custGeom>
+              <a:avLst/>
+              <a:gdLst>
+                <a:gd name="T0" fmla="*/ 1964 w 5067"/>
+                <a:gd name="T1" fmla="*/ 0 h 4720"/>
+                <a:gd name="T2" fmla="*/ 1964 w 5067"/>
+                <a:gd name="T3" fmla="*/ 0 h 4720"/>
+                <a:gd name="T4" fmla="*/ 0 w 5067"/>
+                <a:gd name="T5" fmla="*/ 4720 h 4720"/>
+                <a:gd name="T6" fmla="*/ 5067 w 5067"/>
+                <a:gd name="T7" fmla="*/ 4065 h 4720"/>
+                <a:gd name="T8" fmla="*/ 1964 w 5067"/>
+                <a:gd name="T9" fmla="*/ 0 h 4720"/>
+                <a:gd name="connsiteX0" fmla="*/ 3876 w 10000"/>
+                <a:gd name="connsiteY0" fmla="*/ 0 h 10000"/>
+                <a:gd name="connsiteX1" fmla="*/ 3876 w 10000"/>
+                <a:gd name="connsiteY1" fmla="*/ 0 h 10000"/>
+                <a:gd name="connsiteX2" fmla="*/ 0 w 10000"/>
+                <a:gd name="connsiteY2" fmla="*/ 10000 h 10000"/>
+                <a:gd name="connsiteX3" fmla="*/ 10000 w 10000"/>
+                <a:gd name="connsiteY3" fmla="*/ 8612 h 10000"/>
+                <a:gd name="connsiteX4" fmla="*/ 5270 w 10000"/>
+                <a:gd name="connsiteY4" fmla="*/ 1953 h 10000"/>
+                <a:gd name="connsiteX5" fmla="*/ 3876 w 10000"/>
+                <a:gd name="connsiteY5" fmla="*/ 0 h 10000"/>
+                <a:gd name="connsiteX0" fmla="*/ 3130 w 10000"/>
+                <a:gd name="connsiteY0" fmla="*/ 1943 h 10000"/>
+                <a:gd name="connsiteX1" fmla="*/ 3876 w 10000"/>
+                <a:gd name="connsiteY1" fmla="*/ 0 h 10000"/>
+                <a:gd name="connsiteX2" fmla="*/ 0 w 10000"/>
+                <a:gd name="connsiteY2" fmla="*/ 10000 h 10000"/>
+                <a:gd name="connsiteX3" fmla="*/ 10000 w 10000"/>
+                <a:gd name="connsiteY3" fmla="*/ 8612 h 10000"/>
+                <a:gd name="connsiteX4" fmla="*/ 5270 w 10000"/>
+                <a:gd name="connsiteY4" fmla="*/ 1953 h 10000"/>
+                <a:gd name="connsiteX5" fmla="*/ 3130 w 10000"/>
+                <a:gd name="connsiteY5" fmla="*/ 1943 h 10000"/>
+                <a:gd name="connsiteX0" fmla="*/ 3130 w 10000"/>
+                <a:gd name="connsiteY0" fmla="*/ 0 h 8057"/>
+                <a:gd name="connsiteX1" fmla="*/ 0 w 10000"/>
+                <a:gd name="connsiteY1" fmla="*/ 8057 h 8057"/>
+                <a:gd name="connsiteX2" fmla="*/ 10000 w 10000"/>
+                <a:gd name="connsiteY2" fmla="*/ 6669 h 8057"/>
+                <a:gd name="connsiteX3" fmla="*/ 5270 w 10000"/>
+                <a:gd name="connsiteY3" fmla="*/ 10 h 8057"/>
+                <a:gd name="connsiteX4" fmla="*/ 3130 w 10000"/>
+                <a:gd name="connsiteY4" fmla="*/ 0 h 8057"/>
+                <a:gd name="connsiteX0" fmla="*/ 3130 w 10000"/>
+                <a:gd name="connsiteY0" fmla="*/ 0 h 10000"/>
+                <a:gd name="connsiteX1" fmla="*/ 0 w 10000"/>
+                <a:gd name="connsiteY1" fmla="*/ 10000 h 10000"/>
+                <a:gd name="connsiteX2" fmla="*/ 10000 w 10000"/>
+                <a:gd name="connsiteY2" fmla="*/ 8277 h 10000"/>
+                <a:gd name="connsiteX3" fmla="*/ 8600 w 10000"/>
+                <a:gd name="connsiteY3" fmla="*/ 5849 h 10000"/>
+                <a:gd name="connsiteX4" fmla="*/ 5270 w 10000"/>
+                <a:gd name="connsiteY4" fmla="*/ 12 h 10000"/>
+                <a:gd name="connsiteX5" fmla="*/ 3130 w 10000"/>
+                <a:gd name="connsiteY5" fmla="*/ 0 h 10000"/>
+                <a:gd name="connsiteX0" fmla="*/ 3130 w 8622"/>
+                <a:gd name="connsiteY0" fmla="*/ 0 h 10000"/>
+                <a:gd name="connsiteX1" fmla="*/ 0 w 8622"/>
+                <a:gd name="connsiteY1" fmla="*/ 10000 h 10000"/>
+                <a:gd name="connsiteX2" fmla="*/ 8622 w 8622"/>
+                <a:gd name="connsiteY2" fmla="*/ 8507 h 10000"/>
+                <a:gd name="connsiteX3" fmla="*/ 8600 w 8622"/>
+                <a:gd name="connsiteY3" fmla="*/ 5849 h 10000"/>
+                <a:gd name="connsiteX4" fmla="*/ 5270 w 8622"/>
+                <a:gd name="connsiteY4" fmla="*/ 12 h 10000"/>
+                <a:gd name="connsiteX5" fmla="*/ 3130 w 8622"/>
+                <a:gd name="connsiteY5" fmla="*/ 0 h 10000"/>
+                <a:gd name="connsiteX0" fmla="*/ 3563 w 10000"/>
+                <a:gd name="connsiteY0" fmla="*/ 0 h 10000"/>
+                <a:gd name="connsiteX1" fmla="*/ 0 w 10000"/>
+                <a:gd name="connsiteY1" fmla="*/ 10000 h 10000"/>
+                <a:gd name="connsiteX2" fmla="*/ 10000 w 10000"/>
+                <a:gd name="connsiteY2" fmla="*/ 8507 h 10000"/>
+                <a:gd name="connsiteX3" fmla="*/ 9974 w 10000"/>
+                <a:gd name="connsiteY3" fmla="*/ 5849 h 10000"/>
+                <a:gd name="connsiteX4" fmla="*/ 6112 w 10000"/>
+                <a:gd name="connsiteY4" fmla="*/ 12 h 10000"/>
+                <a:gd name="connsiteX5" fmla="*/ 3563 w 10000"/>
+                <a:gd name="connsiteY5" fmla="*/ 0 h 10000"/>
+              </a:gdLst>
+              <a:ahLst/>
+              <a:cxnLst>
+                <a:cxn ang="0">
+                  <a:pos x="connsiteX0" y="connsiteY0"/>
+                </a:cxn>
+                <a:cxn ang="0">
+                  <a:pos x="connsiteX1" y="connsiteY1"/>
+                </a:cxn>
+                <a:cxn ang="0">
+                  <a:pos x="connsiteX2" y="connsiteY2"/>
+                </a:cxn>
+                <a:cxn ang="0">
+                  <a:pos x="connsiteX3" y="connsiteY3"/>
+                </a:cxn>
+                <a:cxn ang="0">
+                  <a:pos x="connsiteX4" y="connsiteY4"/>
+                </a:cxn>
+                <a:cxn ang="0">
+                  <a:pos x="connsiteX5" y="connsiteY5"/>
+                </a:cxn>
+              </a:cxnLst>
+              <a:rect l="l" t="t" r="r" b="b"/>
+              <a:pathLst>
+                <a:path w="10000" h="10000">
+                  <a:moveTo>
+                    <a:pt x="3563" y="0"/>
+                  </a:moveTo>
+                  <a:lnTo>
+                    <a:pt x="0" y="10000"/>
+                  </a:lnTo>
+                  <a:lnTo>
+                    <a:pt x="10000" y="8507"/>
+                  </a:lnTo>
+                  <a:cubicBezTo>
+                    <a:pt x="9992" y="7621"/>
+                    <a:pt x="9983" y="6735"/>
+                    <a:pt x="9974" y="5849"/>
+                  </a:cubicBezTo>
+                  <a:lnTo>
+                    <a:pt x="6112" y="12"/>
+                  </a:lnTo>
+                  <a:lnTo>
+                    <a:pt x="3563" y="0"/>
+                  </a:lnTo>
+                  <a:close/>
+                </a:path>
+              </a:pathLst>
+            </a:custGeom>
+            <a:solidFill>
+              <a:srgbClr val="F1F1F1"/>
+            </a:solidFill>
+            <a:ln w="0">
+              <a:noFill/>
+              <a:prstDash val="solid"/>
+              <a:round/>
+              <a:headEnd/>
+              <a:tailEnd/>
+            </a:ln>
+          </p:spPr>
+          <p:txBody>
+            <a:bodyPr vert="horz" wrap="square" lIns="91440" tIns="45720" rIns="91440" bIns="45720" numCol="1" anchor="t" anchorCtr="0" compatLnSpc="1">
+              <a:prstTxWarp prst="textNoShape">
                 <a:avLst/>
-                <a:gdLst>
-                  <a:gd name="T0" fmla="*/ 0 w 2675"/>
-                  <a:gd name="T1" fmla="*/ 2498 h 2498"/>
-                  <a:gd name="T2" fmla="*/ 0 w 2675"/>
-                  <a:gd name="T3" fmla="*/ 2498 h 2498"/>
-                  <a:gd name="T4" fmla="*/ 2675 w 2675"/>
-                  <a:gd name="T5" fmla="*/ 2156 h 2498"/>
-                  <a:gd name="T6" fmla="*/ 1054 w 2675"/>
-                  <a:gd name="T7" fmla="*/ 0 h 2498"/>
-                  <a:gd name="T8" fmla="*/ 0 w 2675"/>
-                  <a:gd name="T9" fmla="*/ 2498 h 2498"/>
-                </a:gdLst>
-                <a:ahLst/>
-                <a:cxnLst>
-                  <a:cxn ang="0">
-                    <a:pos x="T0" y="T1"/>
-                  </a:cxn>
-                  <a:cxn ang="0">
-                    <a:pos x="T2" y="T3"/>
-                  </a:cxn>
-                  <a:cxn ang="0">
-                    <a:pos x="T4" y="T5"/>
-                  </a:cxn>
-                  <a:cxn ang="0">
-                    <a:pos x="T6" y="T7"/>
-                  </a:cxn>
-                  <a:cxn ang="0">
-                    <a:pos x="T8" y="T9"/>
-                  </a:cxn>
-                </a:cxnLst>
-                <a:rect l="0" t="0" r="r" b="b"/>
-                <a:pathLst>
-                  <a:path w="2675" h="2498">
-                    <a:moveTo>
-                      <a:pt x="0" y="2498"/>
-                    </a:moveTo>
-                    <a:lnTo>
-                      <a:pt x="0" y="2498"/>
-                    </a:lnTo>
-                    <a:lnTo>
-                      <a:pt x="2675" y="2156"/>
-                    </a:lnTo>
-                    <a:lnTo>
-                      <a:pt x="1054" y="0"/>
-                    </a:lnTo>
-                    <a:lnTo>
-                      <a:pt x="0" y="2498"/>
-                    </a:lnTo>
-                    <a:close/>
-                  </a:path>
-                </a:pathLst>
-              </a:custGeom>
-              <a:solidFill>
-                <a:srgbClr val="D4D5D5"/>
-              </a:solidFill>
-              <a:ln w="0">
-                <a:noFill/>
-                <a:prstDash val="solid"/>
-                <a:round/>
-                <a:headEnd/>
-                <a:tailEnd/>
-              </a:ln>
-            </p:spPr>
-            <p:txBody>
-              <a:bodyPr vert="horz" wrap="square" lIns="91440" tIns="45720" rIns="91440" bIns="45720" numCol="1" anchor="t" anchorCtr="0" compatLnSpc="1">
-                <a:prstTxWarp prst="textNoShape">
-                  <a:avLst/>
-                </a:prstTxWarp>
-              </a:bodyPr>
-              <a:lstStyle/>
-              <a:p>
-                <a:endParaRPr lang="en-US"/>
-              </a:p>
-            </p:txBody>
-          </p:sp>
-          <p:sp>
-            <p:nvSpPr>
-              <p:cNvPr id="13" name="Freeform 6">
-                <a:extLst>
-                  <a:ext uri="{FF2B5EF4-FFF2-40B4-BE49-F238E27FC236}">
-                    <a16:creationId xmlns:a16="http://schemas.microsoft.com/office/drawing/2014/main" id="{F3DE9D65-7E4E-418B-8573-F27D313DCD5D}"/>
-                  </a:ext>
-                </a:extLst>
-              </p:cNvPr>
-              <p:cNvSpPr>
-                <a:spLocks/>
-              </p:cNvSpPr>
-              <p:nvPr userDrawn="1"/>
-            </p:nvSpPr>
-            <p:spPr bwMode="auto">
-              <a:xfrm>
-                <a:off x="8215313" y="0"/>
-                <a:ext cx="3976688" cy="3444875"/>
-              </a:xfrm>
-              <a:custGeom>
-                <a:avLst/>
-                <a:gdLst>
-                  <a:gd name="T0" fmla="*/ 1964 w 5067"/>
-                  <a:gd name="T1" fmla="*/ 0 h 4720"/>
-                  <a:gd name="T2" fmla="*/ 1964 w 5067"/>
-                  <a:gd name="T3" fmla="*/ 0 h 4720"/>
-                  <a:gd name="T4" fmla="*/ 0 w 5067"/>
-                  <a:gd name="T5" fmla="*/ 4720 h 4720"/>
-                  <a:gd name="T6" fmla="*/ 5067 w 5067"/>
-                  <a:gd name="T7" fmla="*/ 4065 h 4720"/>
-                  <a:gd name="T8" fmla="*/ 1964 w 5067"/>
-                  <a:gd name="T9" fmla="*/ 0 h 4720"/>
-                  <a:gd name="connsiteX0" fmla="*/ 3876 w 10000"/>
-                  <a:gd name="connsiteY0" fmla="*/ 0 h 10000"/>
-                  <a:gd name="connsiteX1" fmla="*/ 3876 w 10000"/>
-                  <a:gd name="connsiteY1" fmla="*/ 0 h 10000"/>
-                  <a:gd name="connsiteX2" fmla="*/ 0 w 10000"/>
-                  <a:gd name="connsiteY2" fmla="*/ 10000 h 10000"/>
-                  <a:gd name="connsiteX3" fmla="*/ 10000 w 10000"/>
-                  <a:gd name="connsiteY3" fmla="*/ 8612 h 10000"/>
-                  <a:gd name="connsiteX4" fmla="*/ 5270 w 10000"/>
-                  <a:gd name="connsiteY4" fmla="*/ 1953 h 10000"/>
-                  <a:gd name="connsiteX5" fmla="*/ 3876 w 10000"/>
-                  <a:gd name="connsiteY5" fmla="*/ 0 h 10000"/>
-                  <a:gd name="connsiteX0" fmla="*/ 3130 w 10000"/>
-                  <a:gd name="connsiteY0" fmla="*/ 1943 h 10000"/>
-                  <a:gd name="connsiteX1" fmla="*/ 3876 w 10000"/>
-                  <a:gd name="connsiteY1" fmla="*/ 0 h 10000"/>
-                  <a:gd name="connsiteX2" fmla="*/ 0 w 10000"/>
-                  <a:gd name="connsiteY2" fmla="*/ 10000 h 10000"/>
-                  <a:gd name="connsiteX3" fmla="*/ 10000 w 10000"/>
-                  <a:gd name="connsiteY3" fmla="*/ 8612 h 10000"/>
-                  <a:gd name="connsiteX4" fmla="*/ 5270 w 10000"/>
-                  <a:gd name="connsiteY4" fmla="*/ 1953 h 10000"/>
-                  <a:gd name="connsiteX5" fmla="*/ 3130 w 10000"/>
-                  <a:gd name="connsiteY5" fmla="*/ 1943 h 10000"/>
-                  <a:gd name="connsiteX0" fmla="*/ 3130 w 10000"/>
-                  <a:gd name="connsiteY0" fmla="*/ 0 h 8057"/>
-                  <a:gd name="connsiteX1" fmla="*/ 0 w 10000"/>
-                  <a:gd name="connsiteY1" fmla="*/ 8057 h 8057"/>
-                  <a:gd name="connsiteX2" fmla="*/ 10000 w 10000"/>
-                  <a:gd name="connsiteY2" fmla="*/ 6669 h 8057"/>
-                  <a:gd name="connsiteX3" fmla="*/ 5270 w 10000"/>
-                  <a:gd name="connsiteY3" fmla="*/ 10 h 8057"/>
-                  <a:gd name="connsiteX4" fmla="*/ 3130 w 10000"/>
-                  <a:gd name="connsiteY4" fmla="*/ 0 h 8057"/>
-                  <a:gd name="connsiteX0" fmla="*/ 3130 w 10000"/>
-                  <a:gd name="connsiteY0" fmla="*/ 0 h 10000"/>
-                  <a:gd name="connsiteX1" fmla="*/ 0 w 10000"/>
-                  <a:gd name="connsiteY1" fmla="*/ 10000 h 10000"/>
-                  <a:gd name="connsiteX2" fmla="*/ 10000 w 10000"/>
-                  <a:gd name="connsiteY2" fmla="*/ 8277 h 10000"/>
-                  <a:gd name="connsiteX3" fmla="*/ 8600 w 10000"/>
-                  <a:gd name="connsiteY3" fmla="*/ 5849 h 10000"/>
-                  <a:gd name="connsiteX4" fmla="*/ 5270 w 10000"/>
-                  <a:gd name="connsiteY4" fmla="*/ 12 h 10000"/>
-                  <a:gd name="connsiteX5" fmla="*/ 3130 w 10000"/>
-                  <a:gd name="connsiteY5" fmla="*/ 0 h 10000"/>
-                  <a:gd name="connsiteX0" fmla="*/ 3130 w 8622"/>
-                  <a:gd name="connsiteY0" fmla="*/ 0 h 10000"/>
-                  <a:gd name="connsiteX1" fmla="*/ 0 w 8622"/>
-                  <a:gd name="connsiteY1" fmla="*/ 10000 h 10000"/>
-                  <a:gd name="connsiteX2" fmla="*/ 8622 w 8622"/>
-                  <a:gd name="connsiteY2" fmla="*/ 8507 h 10000"/>
-                  <a:gd name="connsiteX3" fmla="*/ 8600 w 8622"/>
-                  <a:gd name="connsiteY3" fmla="*/ 5849 h 10000"/>
-                  <a:gd name="connsiteX4" fmla="*/ 5270 w 8622"/>
-                  <a:gd name="connsiteY4" fmla="*/ 12 h 10000"/>
-                  <a:gd name="connsiteX5" fmla="*/ 3130 w 8622"/>
-                  <a:gd name="connsiteY5" fmla="*/ 0 h 10000"/>
-                  <a:gd name="connsiteX0" fmla="*/ 3563 w 10000"/>
-                  <a:gd name="connsiteY0" fmla="*/ 0 h 10000"/>
-                  <a:gd name="connsiteX1" fmla="*/ 0 w 10000"/>
-                  <a:gd name="connsiteY1" fmla="*/ 10000 h 10000"/>
-                  <a:gd name="connsiteX2" fmla="*/ 10000 w 10000"/>
-                  <a:gd name="connsiteY2" fmla="*/ 8507 h 10000"/>
-                  <a:gd name="connsiteX3" fmla="*/ 9974 w 10000"/>
-                  <a:gd name="connsiteY3" fmla="*/ 5849 h 10000"/>
-                  <a:gd name="connsiteX4" fmla="*/ 6112 w 10000"/>
-                  <a:gd name="connsiteY4" fmla="*/ 12 h 10000"/>
-                  <a:gd name="connsiteX5" fmla="*/ 3563 w 10000"/>
-                  <a:gd name="connsiteY5" fmla="*/ 0 h 10000"/>
-                </a:gdLst>
-                <a:ahLst/>
-                <a:cxnLst>
-                  <a:cxn ang="0">
-                    <a:pos x="connsiteX0" y="connsiteY0"/>
-                  </a:cxn>
-                  <a:cxn ang="0">
-                    <a:pos x="connsiteX1" y="connsiteY1"/>
-                  </a:cxn>
-                  <a:cxn ang="0">
-                    <a:pos x="connsiteX2" y="connsiteY2"/>
-                  </a:cxn>
-                  <a:cxn ang="0">
-                    <a:pos x="connsiteX3" y="connsiteY3"/>
-                  </a:cxn>
-                  <a:cxn ang="0">
-                    <a:pos x="connsiteX4" y="connsiteY4"/>
-                  </a:cxn>
-                  <a:cxn ang="0">
-                    <a:pos x="connsiteX5" y="connsiteY5"/>
-                  </a:cxn>
-                </a:cxnLst>
-                <a:rect l="l" t="t" r="r" b="b"/>
-                <a:pathLst>
-                  <a:path w="10000" h="10000">
-                    <a:moveTo>
-                      <a:pt x="3563" y="0"/>
-                    </a:moveTo>
-                    <a:lnTo>
-                      <a:pt x="0" y="10000"/>
-                    </a:lnTo>
-                    <a:lnTo>
-                      <a:pt x="10000" y="8507"/>
-                    </a:lnTo>
-                    <a:cubicBezTo>
-                      <a:pt x="9992" y="7621"/>
-                      <a:pt x="9983" y="6735"/>
-                      <a:pt x="9974" y="5849"/>
-                    </a:cubicBezTo>
-                    <a:lnTo>
-                      <a:pt x="6112" y="12"/>
-                    </a:lnTo>
-                    <a:lnTo>
-                      <a:pt x="3563" y="0"/>
-                    </a:lnTo>
-                    <a:close/>
-                  </a:path>
-                </a:pathLst>
-              </a:custGeom>
-              <a:solidFill>
-                <a:srgbClr val="F1F1F1"/>
-              </a:solidFill>
-              <a:ln w="0">
-                <a:noFill/>
-                <a:prstDash val="solid"/>
-                <a:round/>
-                <a:headEnd/>
-                <a:tailEnd/>
-              </a:ln>
-            </p:spPr>
-            <p:txBody>
-              <a:bodyPr vert="horz" wrap="square" lIns="91440" tIns="45720" rIns="91440" bIns="45720" numCol="1" anchor="t" anchorCtr="0" compatLnSpc="1">
-                <a:prstTxWarp prst="textNoShape">
-                  <a:avLst/>
-                </a:prstTxWarp>
-              </a:bodyPr>
-              <a:lstStyle/>
-              <a:p>
-                <a:endParaRPr lang="en-US"/>
-              </a:p>
-            </p:txBody>
-          </p:sp>
-          <p:sp>
-            <p:nvSpPr>
-              <p:cNvPr id="14" name="Freeform 7">
-                <a:extLst>
-                  <a:ext uri="{FF2B5EF4-FFF2-40B4-BE49-F238E27FC236}">
-                    <a16:creationId xmlns:a16="http://schemas.microsoft.com/office/drawing/2014/main" id="{8CBD47FD-4E51-4AEC-B6A4-5EB3AC574321}"/>
-                  </a:ext>
-                </a:extLst>
-              </p:cNvPr>
-              <p:cNvSpPr>
-                <a:spLocks/>
-              </p:cNvSpPr>
-              <p:nvPr userDrawn="1"/>
-            </p:nvSpPr>
-            <p:spPr bwMode="auto">
-              <a:xfrm>
-                <a:off x="8213725" y="3211513"/>
-                <a:ext cx="1808162" cy="1693863"/>
-              </a:xfrm>
-              <a:custGeom>
-                <a:avLst/>
-                <a:gdLst>
-                  <a:gd name="T0" fmla="*/ 0 w 1985"/>
-                  <a:gd name="T1" fmla="*/ 257 h 1861"/>
-                  <a:gd name="T2" fmla="*/ 0 w 1985"/>
-                  <a:gd name="T3" fmla="*/ 257 h 1861"/>
-                  <a:gd name="T4" fmla="*/ 1985 w 1985"/>
-                  <a:gd name="T5" fmla="*/ 0 h 1861"/>
-                  <a:gd name="T6" fmla="*/ 1206 w 1985"/>
-                  <a:gd name="T7" fmla="*/ 1861 h 1861"/>
-                  <a:gd name="T8" fmla="*/ 0 w 1985"/>
-                  <a:gd name="T9" fmla="*/ 257 h 1861"/>
-                </a:gdLst>
-                <a:ahLst/>
-                <a:cxnLst>
-                  <a:cxn ang="0">
-                    <a:pos x="T0" y="T1"/>
-                  </a:cxn>
-                  <a:cxn ang="0">
-                    <a:pos x="T2" y="T3"/>
-                  </a:cxn>
-                  <a:cxn ang="0">
-                    <a:pos x="T4" y="T5"/>
-                  </a:cxn>
-                  <a:cxn ang="0">
-                    <a:pos x="T6" y="T7"/>
-                  </a:cxn>
-                  <a:cxn ang="0">
-                    <a:pos x="T8" y="T9"/>
-                  </a:cxn>
-                </a:cxnLst>
-                <a:rect l="0" t="0" r="r" b="b"/>
-                <a:pathLst>
-                  <a:path w="1985" h="1861">
-                    <a:moveTo>
-                      <a:pt x="0" y="257"/>
-                    </a:moveTo>
-                    <a:lnTo>
-                      <a:pt x="0" y="257"/>
-                    </a:lnTo>
-                    <a:lnTo>
-                      <a:pt x="1985" y="0"/>
-                    </a:lnTo>
-                    <a:lnTo>
-                      <a:pt x="1206" y="1861"/>
-                    </a:lnTo>
-                    <a:lnTo>
-                      <a:pt x="0" y="257"/>
-                    </a:lnTo>
-                    <a:close/>
-                  </a:path>
-                </a:pathLst>
-              </a:custGeom>
-              <a:solidFill>
-                <a:srgbClr val="EDEDED"/>
-              </a:solidFill>
-              <a:ln w="0">
-                <a:noFill/>
-                <a:prstDash val="solid"/>
-                <a:round/>
-                <a:headEnd/>
-                <a:tailEnd/>
-              </a:ln>
-            </p:spPr>
-            <p:txBody>
-              <a:bodyPr vert="horz" wrap="square" lIns="91440" tIns="45720" rIns="91440" bIns="45720" numCol="1" anchor="t" anchorCtr="0" compatLnSpc="1">
-                <a:prstTxWarp prst="textNoShape">
-                  <a:avLst/>
-                </a:prstTxWarp>
-              </a:bodyPr>
-              <a:lstStyle/>
-              <a:p>
-                <a:endParaRPr lang="en-US"/>
-              </a:p>
-            </p:txBody>
-          </p:sp>
-          <p:sp>
-            <p:nvSpPr>
-              <p:cNvPr id="15" name="Freeform 8">
-                <a:extLst>
-                  <a:ext uri="{FF2B5EF4-FFF2-40B4-BE49-F238E27FC236}">
-                    <a16:creationId xmlns:a16="http://schemas.microsoft.com/office/drawing/2014/main" id="{7A8AC249-C002-4DEF-A4C7-F4F627714DBB}"/>
-                  </a:ext>
-                </a:extLst>
-              </p:cNvPr>
-              <p:cNvSpPr>
-                <a:spLocks/>
-              </p:cNvSpPr>
-              <p:nvPr userDrawn="1"/>
-            </p:nvSpPr>
-            <p:spPr bwMode="auto">
-              <a:xfrm>
-                <a:off x="6588125" y="3443288"/>
-                <a:ext cx="1627187" cy="1525588"/>
-              </a:xfrm>
-              <a:custGeom>
-                <a:avLst/>
-                <a:gdLst>
-                  <a:gd name="T0" fmla="*/ 0 w 1785"/>
-                  <a:gd name="T1" fmla="*/ 231 h 1676"/>
-                  <a:gd name="T2" fmla="*/ 0 w 1785"/>
-                  <a:gd name="T3" fmla="*/ 231 h 1676"/>
-                  <a:gd name="T4" fmla="*/ 1785 w 1785"/>
-                  <a:gd name="T5" fmla="*/ 0 h 1676"/>
-                  <a:gd name="T6" fmla="*/ 1087 w 1785"/>
-                  <a:gd name="T7" fmla="*/ 1676 h 1676"/>
-                  <a:gd name="T8" fmla="*/ 0 w 1785"/>
-                  <a:gd name="T9" fmla="*/ 231 h 1676"/>
-                </a:gdLst>
-                <a:ahLst/>
-                <a:cxnLst>
-                  <a:cxn ang="0">
-                    <a:pos x="T0" y="T1"/>
-                  </a:cxn>
-                  <a:cxn ang="0">
-                    <a:pos x="T2" y="T3"/>
-                  </a:cxn>
-                  <a:cxn ang="0">
-                    <a:pos x="T4" y="T5"/>
-                  </a:cxn>
-                  <a:cxn ang="0">
-                    <a:pos x="T6" y="T7"/>
-                  </a:cxn>
-                  <a:cxn ang="0">
-                    <a:pos x="T8" y="T9"/>
-                  </a:cxn>
-                </a:cxnLst>
-                <a:rect l="0" t="0" r="r" b="b"/>
-                <a:pathLst>
-                  <a:path w="1785" h="1676">
-                    <a:moveTo>
-                      <a:pt x="0" y="231"/>
-                    </a:moveTo>
-                    <a:lnTo>
-                      <a:pt x="0" y="231"/>
-                    </a:lnTo>
-                    <a:lnTo>
-                      <a:pt x="1785" y="0"/>
-                    </a:lnTo>
-                    <a:lnTo>
-                      <a:pt x="1087" y="1676"/>
-                    </a:lnTo>
-                    <a:lnTo>
-                      <a:pt x="0" y="231"/>
-                    </a:lnTo>
-                    <a:close/>
-                  </a:path>
-                </a:pathLst>
-              </a:custGeom>
-              <a:solidFill>
-                <a:srgbClr val="D0D0D0"/>
-              </a:solidFill>
-              <a:ln w="0">
-                <a:noFill/>
-                <a:prstDash val="solid"/>
-                <a:round/>
-                <a:headEnd/>
-                <a:tailEnd/>
-              </a:ln>
-            </p:spPr>
-            <p:txBody>
-              <a:bodyPr vert="horz" wrap="square" lIns="91440" tIns="45720" rIns="91440" bIns="45720" numCol="1" anchor="t" anchorCtr="0" compatLnSpc="1">
-                <a:prstTxWarp prst="textNoShape">
-                  <a:avLst/>
-                </a:prstTxWarp>
-              </a:bodyPr>
-              <a:lstStyle/>
-              <a:p>
-                <a:endParaRPr lang="en-US"/>
-              </a:p>
-            </p:txBody>
-          </p:sp>
-          <p:sp>
-            <p:nvSpPr>
-              <p:cNvPr id="16" name="Freeform 9">
-                <a:extLst>
-                  <a:ext uri="{FF2B5EF4-FFF2-40B4-BE49-F238E27FC236}">
-                    <a16:creationId xmlns:a16="http://schemas.microsoft.com/office/drawing/2014/main" id="{FDD6CC8C-E210-4702-B45C-2DE90A9BCDBE}"/>
-                  </a:ext>
-                </a:extLst>
-              </p:cNvPr>
-              <p:cNvSpPr>
-                <a:spLocks/>
-              </p:cNvSpPr>
-              <p:nvPr userDrawn="1"/>
-            </p:nvSpPr>
-            <p:spPr bwMode="auto">
-              <a:xfrm>
-                <a:off x="6343650" y="576263"/>
-                <a:ext cx="3065462" cy="2867025"/>
-              </a:xfrm>
-              <a:custGeom>
-                <a:avLst/>
-                <a:gdLst>
-                  <a:gd name="T0" fmla="*/ 3364 w 3364"/>
-                  <a:gd name="T1" fmla="*/ 0 h 3150"/>
-                  <a:gd name="T2" fmla="*/ 3364 w 3364"/>
-                  <a:gd name="T3" fmla="*/ 0 h 3150"/>
-                  <a:gd name="T4" fmla="*/ 2053 w 3364"/>
-                  <a:gd name="T5" fmla="*/ 3150 h 3150"/>
-                  <a:gd name="T6" fmla="*/ 0 w 3364"/>
-                  <a:gd name="T7" fmla="*/ 428 h 3150"/>
-                  <a:gd name="T8" fmla="*/ 3364 w 3364"/>
-                  <a:gd name="T9" fmla="*/ 0 h 3150"/>
-                </a:gdLst>
-                <a:ahLst/>
-                <a:cxnLst>
-                  <a:cxn ang="0">
-                    <a:pos x="T0" y="T1"/>
-                  </a:cxn>
-                  <a:cxn ang="0">
-                    <a:pos x="T2" y="T3"/>
-                  </a:cxn>
-                  <a:cxn ang="0">
-                    <a:pos x="T4" y="T5"/>
-                  </a:cxn>
-                  <a:cxn ang="0">
-                    <a:pos x="T6" y="T7"/>
-                  </a:cxn>
-                  <a:cxn ang="0">
-                    <a:pos x="T8" y="T9"/>
-                  </a:cxn>
-                </a:cxnLst>
-                <a:rect l="0" t="0" r="r" b="b"/>
-                <a:pathLst>
-                  <a:path w="3364" h="3150">
-                    <a:moveTo>
-                      <a:pt x="3364" y="0"/>
-                    </a:moveTo>
-                    <a:lnTo>
-                      <a:pt x="3364" y="0"/>
-                    </a:lnTo>
-                    <a:lnTo>
-                      <a:pt x="2053" y="3150"/>
-                    </a:lnTo>
-                    <a:lnTo>
-                      <a:pt x="0" y="428"/>
-                    </a:lnTo>
-                    <a:lnTo>
-                      <a:pt x="3364" y="0"/>
-                    </a:lnTo>
-                    <a:close/>
-                  </a:path>
-                </a:pathLst>
-              </a:custGeom>
-              <a:solidFill>
-                <a:srgbClr val="E4E5E5"/>
-              </a:solidFill>
-              <a:ln w="0">
-                <a:noFill/>
-                <a:prstDash val="solid"/>
-                <a:round/>
-                <a:headEnd/>
-                <a:tailEnd/>
-              </a:ln>
-            </p:spPr>
-            <p:txBody>
-              <a:bodyPr vert="horz" wrap="square" lIns="91440" tIns="45720" rIns="91440" bIns="45720" numCol="1" anchor="t" anchorCtr="0" compatLnSpc="1">
-                <a:prstTxWarp prst="textNoShape">
-                  <a:avLst/>
-                </a:prstTxWarp>
-              </a:bodyPr>
-              <a:lstStyle/>
-              <a:p>
-                <a:endParaRPr lang="en-US"/>
-              </a:p>
-            </p:txBody>
-          </p:sp>
-          <p:sp>
-            <p:nvSpPr>
-              <p:cNvPr id="18" name="Freeform 10">
-                <a:extLst>
-                  <a:ext uri="{FF2B5EF4-FFF2-40B4-BE49-F238E27FC236}">
-                    <a16:creationId xmlns:a16="http://schemas.microsoft.com/office/drawing/2014/main" id="{6ADBE84F-E790-42AD-B844-0201AFE75290}"/>
-                  </a:ext>
-                </a:extLst>
-              </p:cNvPr>
-              <p:cNvSpPr>
-                <a:spLocks/>
-              </p:cNvSpPr>
-              <p:nvPr userDrawn="1"/>
-            </p:nvSpPr>
-            <p:spPr bwMode="auto">
-              <a:xfrm>
-                <a:off x="7143750" y="3444875"/>
-                <a:ext cx="2744787" cy="2568575"/>
-              </a:xfrm>
-              <a:custGeom>
-                <a:avLst/>
-                <a:gdLst>
-                  <a:gd name="T0" fmla="*/ 0 w 3012"/>
-                  <a:gd name="T1" fmla="*/ 2823 h 2823"/>
-                  <a:gd name="T2" fmla="*/ 0 w 3012"/>
-                  <a:gd name="T3" fmla="*/ 2823 h 2823"/>
-                  <a:gd name="T4" fmla="*/ 3012 w 3012"/>
-                  <a:gd name="T5" fmla="*/ 2448 h 2823"/>
-                  <a:gd name="T6" fmla="*/ 1175 w 3012"/>
-                  <a:gd name="T7" fmla="*/ 0 h 2823"/>
-                  <a:gd name="T8" fmla="*/ 0 w 3012"/>
-                  <a:gd name="T9" fmla="*/ 2823 h 2823"/>
-                </a:gdLst>
-                <a:ahLst/>
-                <a:cxnLst>
-                  <a:cxn ang="0">
-                    <a:pos x="T0" y="T1"/>
-                  </a:cxn>
-                  <a:cxn ang="0">
-                    <a:pos x="T2" y="T3"/>
-                  </a:cxn>
-                  <a:cxn ang="0">
-                    <a:pos x="T4" y="T5"/>
-                  </a:cxn>
-                  <a:cxn ang="0">
-                    <a:pos x="T6" y="T7"/>
-                  </a:cxn>
-                  <a:cxn ang="0">
-                    <a:pos x="T8" y="T9"/>
-                  </a:cxn>
-                </a:cxnLst>
-                <a:rect l="0" t="0" r="r" b="b"/>
-                <a:pathLst>
-                  <a:path w="3012" h="2823">
-                    <a:moveTo>
-                      <a:pt x="0" y="2823"/>
-                    </a:moveTo>
-                    <a:lnTo>
-                      <a:pt x="0" y="2823"/>
-                    </a:lnTo>
-                    <a:lnTo>
-                      <a:pt x="3012" y="2448"/>
-                    </a:lnTo>
-                    <a:lnTo>
-                      <a:pt x="1175" y="0"/>
-                    </a:lnTo>
-                    <a:lnTo>
-                      <a:pt x="0" y="2823"/>
-                    </a:lnTo>
-                    <a:close/>
-                  </a:path>
-                </a:pathLst>
-              </a:custGeom>
-              <a:solidFill>
-                <a:srgbClr val="DCDDDD"/>
-              </a:solidFill>
-              <a:ln w="0">
-                <a:noFill/>
-                <a:prstDash val="solid"/>
-                <a:round/>
-                <a:headEnd/>
-                <a:tailEnd/>
-              </a:ln>
-            </p:spPr>
-            <p:txBody>
-              <a:bodyPr vert="horz" wrap="square" lIns="91440" tIns="45720" rIns="91440" bIns="45720" numCol="1" anchor="t" anchorCtr="0" compatLnSpc="1">
-                <a:prstTxWarp prst="textNoShape">
-                  <a:avLst/>
-                </a:prstTxWarp>
-              </a:bodyPr>
-              <a:lstStyle/>
-              <a:p>
-                <a:endParaRPr lang="en-US"/>
-              </a:p>
-            </p:txBody>
-          </p:sp>
-        </p:grpSp>
+              </a:prstTxWarp>
+            </a:bodyPr>
+            <a:lstStyle/>
+            <a:p>
+              <a:endParaRPr lang="en-US"/>
+            </a:p>
+          </p:txBody>
+        </p:sp>
         <p:sp>
           <p:nvSpPr>
-            <p:cNvPr id="19" name="Azure">
+            <p:cNvPr id="14" name="Freeform 7">
               <a:extLst>
                 <a:ext uri="{FF2B5EF4-FFF2-40B4-BE49-F238E27FC236}">
-                  <a16:creationId xmlns:a16="http://schemas.microsoft.com/office/drawing/2014/main" id="{F96A3B00-E57B-4D1C-9DF0-FDEB63488325}"/>
+                  <a16:creationId xmlns:a16="http://schemas.microsoft.com/office/drawing/2014/main" id="{8CBD47FD-4E51-4AEC-B6A4-5EB3AC574321}"/>
                 </a:ext>
               </a:extLst>
             </p:cNvPr>
-            <p:cNvSpPr txBox="1"/>
+            <p:cNvSpPr>
+              <a:spLocks/>
+            </p:cNvSpPr>
             <p:nvPr userDrawn="1"/>
           </p:nvSpPr>
-          <p:spPr>
+          <p:spPr bwMode="auto">
             <a:xfrm>
-              <a:off x="10830643" y="425961"/>
-              <a:ext cx="904157" cy="430887"/>
+              <a:off x="8213725" y="3211513"/>
+              <a:ext cx="1808162" cy="1693863"/>
             </a:xfrm>
-            <a:prstGeom prst="rect">
+            <a:custGeom>
               <a:avLst/>
-            </a:prstGeom>
+              <a:gdLst>
+                <a:gd name="T0" fmla="*/ 0 w 1985"/>
+                <a:gd name="T1" fmla="*/ 257 h 1861"/>
+                <a:gd name="T2" fmla="*/ 0 w 1985"/>
+                <a:gd name="T3" fmla="*/ 257 h 1861"/>
+                <a:gd name="T4" fmla="*/ 1985 w 1985"/>
+                <a:gd name="T5" fmla="*/ 0 h 1861"/>
+                <a:gd name="T6" fmla="*/ 1206 w 1985"/>
+                <a:gd name="T7" fmla="*/ 1861 h 1861"/>
+                <a:gd name="T8" fmla="*/ 0 w 1985"/>
+                <a:gd name="T9" fmla="*/ 257 h 1861"/>
+              </a:gdLst>
+              <a:ahLst/>
+              <a:cxnLst>
+                <a:cxn ang="0">
+                  <a:pos x="T0" y="T1"/>
+                </a:cxn>
+                <a:cxn ang="0">
+                  <a:pos x="T2" y="T3"/>
+                </a:cxn>
+                <a:cxn ang="0">
+                  <a:pos x="T4" y="T5"/>
+                </a:cxn>
+                <a:cxn ang="0">
+                  <a:pos x="T6" y="T7"/>
+                </a:cxn>
+                <a:cxn ang="0">
+                  <a:pos x="T8" y="T9"/>
+                </a:cxn>
+              </a:cxnLst>
+              <a:rect l="0" t="0" r="r" b="b"/>
+              <a:pathLst>
+                <a:path w="1985" h="1861">
+                  <a:moveTo>
+                    <a:pt x="0" y="257"/>
+                  </a:moveTo>
+                  <a:lnTo>
+                    <a:pt x="0" y="257"/>
+                  </a:lnTo>
+                  <a:lnTo>
+                    <a:pt x="1985" y="0"/>
+                  </a:lnTo>
+                  <a:lnTo>
+                    <a:pt x="1206" y="1861"/>
+                  </a:lnTo>
+                  <a:lnTo>
+                    <a:pt x="0" y="257"/>
+                  </a:lnTo>
+                  <a:close/>
+                </a:path>
+              </a:pathLst>
+            </a:custGeom>
+            <a:solidFill>
+              <a:srgbClr val="EDEDED"/>
+            </a:solidFill>
+            <a:ln w="0">
+              <a:noFill/>
+              <a:prstDash val="solid"/>
+              <a:round/>
+              <a:headEnd/>
+              <a:tailEnd/>
+            </a:ln>
           </p:spPr>
           <p:txBody>
-            <a:bodyPr wrap="none" lIns="0" tIns="0" rIns="0" bIns="0" rtlCol="0" anchor="t" anchorCtr="0">
-              <a:spAutoFit/>
+            <a:bodyPr vert="horz" wrap="square" lIns="91440" tIns="45720" rIns="91440" bIns="45720" numCol="1" anchor="t" anchorCtr="0" compatLnSpc="1">
+              <a:prstTxWarp prst="textNoShape">
+                <a:avLst/>
+              </a:prstTxWarp>
             </a:bodyPr>
             <a:lstStyle/>
             <a:p>
-              <a:pPr algn="r"/>
-              <a:r>
-                <a:rPr lang="en-US" sz="2800" dirty="0"/>
-                <a:t>Azure</a:t>
-              </a:r>
+              <a:endParaRPr lang="en-US"/>
+            </a:p>
+          </p:txBody>
+        </p:sp>
+        <p:sp>
+          <p:nvSpPr>
+            <p:cNvPr id="15" name="Freeform 8">
+              <a:extLst>
+                <a:ext uri="{FF2B5EF4-FFF2-40B4-BE49-F238E27FC236}">
+                  <a16:creationId xmlns:a16="http://schemas.microsoft.com/office/drawing/2014/main" id="{7A8AC249-C002-4DEF-A4C7-F4F627714DBB}"/>
+                </a:ext>
+              </a:extLst>
+            </p:cNvPr>
+            <p:cNvSpPr>
+              <a:spLocks/>
+            </p:cNvSpPr>
+            <p:nvPr userDrawn="1"/>
+          </p:nvSpPr>
+          <p:spPr bwMode="auto">
+            <a:xfrm>
+              <a:off x="6588125" y="3443288"/>
+              <a:ext cx="1627187" cy="1525588"/>
+            </a:xfrm>
+            <a:custGeom>
+              <a:avLst/>
+              <a:gdLst>
+                <a:gd name="T0" fmla="*/ 0 w 1785"/>
+                <a:gd name="T1" fmla="*/ 231 h 1676"/>
+                <a:gd name="T2" fmla="*/ 0 w 1785"/>
+                <a:gd name="T3" fmla="*/ 231 h 1676"/>
+                <a:gd name="T4" fmla="*/ 1785 w 1785"/>
+                <a:gd name="T5" fmla="*/ 0 h 1676"/>
+                <a:gd name="T6" fmla="*/ 1087 w 1785"/>
+                <a:gd name="T7" fmla="*/ 1676 h 1676"/>
+                <a:gd name="T8" fmla="*/ 0 w 1785"/>
+                <a:gd name="T9" fmla="*/ 231 h 1676"/>
+              </a:gdLst>
+              <a:ahLst/>
+              <a:cxnLst>
+                <a:cxn ang="0">
+                  <a:pos x="T0" y="T1"/>
+                </a:cxn>
+                <a:cxn ang="0">
+                  <a:pos x="T2" y="T3"/>
+                </a:cxn>
+                <a:cxn ang="0">
+                  <a:pos x="T4" y="T5"/>
+                </a:cxn>
+                <a:cxn ang="0">
+                  <a:pos x="T6" y="T7"/>
+                </a:cxn>
+                <a:cxn ang="0">
+                  <a:pos x="T8" y="T9"/>
+                </a:cxn>
+              </a:cxnLst>
+              <a:rect l="0" t="0" r="r" b="b"/>
+              <a:pathLst>
+                <a:path w="1785" h="1676">
+                  <a:moveTo>
+                    <a:pt x="0" y="231"/>
+                  </a:moveTo>
+                  <a:lnTo>
+                    <a:pt x="0" y="231"/>
+                  </a:lnTo>
+                  <a:lnTo>
+                    <a:pt x="1785" y="0"/>
+                  </a:lnTo>
+                  <a:lnTo>
+                    <a:pt x="1087" y="1676"/>
+                  </a:lnTo>
+                  <a:lnTo>
+                    <a:pt x="0" y="231"/>
+                  </a:lnTo>
+                  <a:close/>
+                </a:path>
+              </a:pathLst>
+            </a:custGeom>
+            <a:solidFill>
+              <a:srgbClr val="D0D0D0"/>
+            </a:solidFill>
+            <a:ln w="0">
+              <a:noFill/>
+              <a:prstDash val="solid"/>
+              <a:round/>
+              <a:headEnd/>
+              <a:tailEnd/>
+            </a:ln>
+          </p:spPr>
+          <p:txBody>
+            <a:bodyPr vert="horz" wrap="square" lIns="91440" tIns="45720" rIns="91440" bIns="45720" numCol="1" anchor="t" anchorCtr="0" compatLnSpc="1">
+              <a:prstTxWarp prst="textNoShape">
+                <a:avLst/>
+              </a:prstTxWarp>
+            </a:bodyPr>
+            <a:lstStyle/>
+            <a:p>
+              <a:endParaRPr lang="en-US"/>
+            </a:p>
+          </p:txBody>
+        </p:sp>
+        <p:sp>
+          <p:nvSpPr>
+            <p:cNvPr id="16" name="Freeform 9">
+              <a:extLst>
+                <a:ext uri="{FF2B5EF4-FFF2-40B4-BE49-F238E27FC236}">
+                  <a16:creationId xmlns:a16="http://schemas.microsoft.com/office/drawing/2014/main" id="{FDD6CC8C-E210-4702-B45C-2DE90A9BCDBE}"/>
+                </a:ext>
+              </a:extLst>
+            </p:cNvPr>
+            <p:cNvSpPr>
+              <a:spLocks/>
+            </p:cNvSpPr>
+            <p:nvPr userDrawn="1"/>
+          </p:nvSpPr>
+          <p:spPr bwMode="auto">
+            <a:xfrm>
+              <a:off x="6343650" y="576263"/>
+              <a:ext cx="3065462" cy="2867025"/>
+            </a:xfrm>
+            <a:custGeom>
+              <a:avLst/>
+              <a:gdLst>
+                <a:gd name="T0" fmla="*/ 3364 w 3364"/>
+                <a:gd name="T1" fmla="*/ 0 h 3150"/>
+                <a:gd name="T2" fmla="*/ 3364 w 3364"/>
+                <a:gd name="T3" fmla="*/ 0 h 3150"/>
+                <a:gd name="T4" fmla="*/ 2053 w 3364"/>
+                <a:gd name="T5" fmla="*/ 3150 h 3150"/>
+                <a:gd name="T6" fmla="*/ 0 w 3364"/>
+                <a:gd name="T7" fmla="*/ 428 h 3150"/>
+                <a:gd name="T8" fmla="*/ 3364 w 3364"/>
+                <a:gd name="T9" fmla="*/ 0 h 3150"/>
+              </a:gdLst>
+              <a:ahLst/>
+              <a:cxnLst>
+                <a:cxn ang="0">
+                  <a:pos x="T0" y="T1"/>
+                </a:cxn>
+                <a:cxn ang="0">
+                  <a:pos x="T2" y="T3"/>
+                </a:cxn>
+                <a:cxn ang="0">
+                  <a:pos x="T4" y="T5"/>
+                </a:cxn>
+                <a:cxn ang="0">
+                  <a:pos x="T6" y="T7"/>
+                </a:cxn>
+                <a:cxn ang="0">
+                  <a:pos x="T8" y="T9"/>
+                </a:cxn>
+              </a:cxnLst>
+              <a:rect l="0" t="0" r="r" b="b"/>
+              <a:pathLst>
+                <a:path w="3364" h="3150">
+                  <a:moveTo>
+                    <a:pt x="3364" y="0"/>
+                  </a:moveTo>
+                  <a:lnTo>
+                    <a:pt x="3364" y="0"/>
+                  </a:lnTo>
+                  <a:lnTo>
+                    <a:pt x="2053" y="3150"/>
+                  </a:lnTo>
+                  <a:lnTo>
+                    <a:pt x="0" y="428"/>
+                  </a:lnTo>
+                  <a:lnTo>
+                    <a:pt x="3364" y="0"/>
+                  </a:lnTo>
+                  <a:close/>
+                </a:path>
+              </a:pathLst>
+            </a:custGeom>
+            <a:solidFill>
+              <a:srgbClr val="E4E5E5"/>
+            </a:solidFill>
+            <a:ln w="0">
+              <a:noFill/>
+              <a:prstDash val="solid"/>
+              <a:round/>
+              <a:headEnd/>
+              <a:tailEnd/>
+            </a:ln>
+          </p:spPr>
+          <p:txBody>
+            <a:bodyPr vert="horz" wrap="square" lIns="91440" tIns="45720" rIns="91440" bIns="45720" numCol="1" anchor="t" anchorCtr="0" compatLnSpc="1">
+              <a:prstTxWarp prst="textNoShape">
+                <a:avLst/>
+              </a:prstTxWarp>
+            </a:bodyPr>
+            <a:lstStyle/>
+            <a:p>
+              <a:endParaRPr lang="en-US"/>
+            </a:p>
+          </p:txBody>
+        </p:sp>
+        <p:sp>
+          <p:nvSpPr>
+            <p:cNvPr id="18" name="Freeform 10">
+              <a:extLst>
+                <a:ext uri="{FF2B5EF4-FFF2-40B4-BE49-F238E27FC236}">
+                  <a16:creationId xmlns:a16="http://schemas.microsoft.com/office/drawing/2014/main" id="{6ADBE84F-E790-42AD-B844-0201AFE75290}"/>
+                </a:ext>
+              </a:extLst>
+            </p:cNvPr>
+            <p:cNvSpPr>
+              <a:spLocks/>
+            </p:cNvSpPr>
+            <p:nvPr userDrawn="1"/>
+          </p:nvSpPr>
+          <p:spPr bwMode="auto">
+            <a:xfrm>
+              <a:off x="7143750" y="3444875"/>
+              <a:ext cx="2744787" cy="2568575"/>
+            </a:xfrm>
+            <a:custGeom>
+              <a:avLst/>
+              <a:gdLst>
+                <a:gd name="T0" fmla="*/ 0 w 3012"/>
+                <a:gd name="T1" fmla="*/ 2823 h 2823"/>
+                <a:gd name="T2" fmla="*/ 0 w 3012"/>
+                <a:gd name="T3" fmla="*/ 2823 h 2823"/>
+                <a:gd name="T4" fmla="*/ 3012 w 3012"/>
+                <a:gd name="T5" fmla="*/ 2448 h 2823"/>
+                <a:gd name="T6" fmla="*/ 1175 w 3012"/>
+                <a:gd name="T7" fmla="*/ 0 h 2823"/>
+                <a:gd name="T8" fmla="*/ 0 w 3012"/>
+                <a:gd name="T9" fmla="*/ 2823 h 2823"/>
+              </a:gdLst>
+              <a:ahLst/>
+              <a:cxnLst>
+                <a:cxn ang="0">
+                  <a:pos x="T0" y="T1"/>
+                </a:cxn>
+                <a:cxn ang="0">
+                  <a:pos x="T2" y="T3"/>
+                </a:cxn>
+                <a:cxn ang="0">
+                  <a:pos x="T4" y="T5"/>
+                </a:cxn>
+                <a:cxn ang="0">
+                  <a:pos x="T6" y="T7"/>
+                </a:cxn>
+                <a:cxn ang="0">
+                  <a:pos x="T8" y="T9"/>
+                </a:cxn>
+              </a:cxnLst>
+              <a:rect l="0" t="0" r="r" b="b"/>
+              <a:pathLst>
+                <a:path w="3012" h="2823">
+                  <a:moveTo>
+                    <a:pt x="0" y="2823"/>
+                  </a:moveTo>
+                  <a:lnTo>
+                    <a:pt x="0" y="2823"/>
+                  </a:lnTo>
+                  <a:lnTo>
+                    <a:pt x="3012" y="2448"/>
+                  </a:lnTo>
+                  <a:lnTo>
+                    <a:pt x="1175" y="0"/>
+                  </a:lnTo>
+                  <a:lnTo>
+                    <a:pt x="0" y="2823"/>
+                  </a:lnTo>
+                  <a:close/>
+                </a:path>
+              </a:pathLst>
+            </a:custGeom>
+            <a:solidFill>
+              <a:srgbClr val="DCDDDD"/>
+            </a:solidFill>
+            <a:ln w="0">
+              <a:noFill/>
+              <a:prstDash val="solid"/>
+              <a:round/>
+              <a:headEnd/>
+              <a:tailEnd/>
+            </a:ln>
+          </p:spPr>
+          <p:txBody>
+            <a:bodyPr vert="horz" wrap="square" lIns="91440" tIns="45720" rIns="91440" bIns="45720" numCol="1" anchor="t" anchorCtr="0" compatLnSpc="1">
+              <a:prstTxWarp prst="textNoShape">
+                <a:avLst/>
+              </a:prstTxWarp>
+            </a:bodyPr>
+            <a:lstStyle/>
+            <a:p>
+              <a:endParaRPr lang="en-US"/>
             </a:p>
           </p:txBody>
         </p:sp>
@@ -1423,6 +1026,53 @@
           </a:p>
         </p:txBody>
       </p:sp>
+      <p:pic>
+        <p:nvPicPr>
+          <p:cNvPr id="11" name="Picture 2">
+            <a:extLst>
+              <a:ext uri="{FF2B5EF4-FFF2-40B4-BE49-F238E27FC236}">
+                <a16:creationId xmlns:a16="http://schemas.microsoft.com/office/drawing/2014/main" id="{3B4F2438-4A5C-4FA4-9071-479AA7864027}"/>
+              </a:ext>
+            </a:extLst>
+          </p:cNvPr>
+          <p:cNvPicPr>
+            <a:picLocks noChangeAspect="1" noChangeArrowheads="1"/>
+          </p:cNvPicPr>
+          <p:nvPr userDrawn="1"/>
+        </p:nvPicPr>
+        <p:blipFill>
+          <a:blip r:embed="rId2">
+            <a:extLst>
+              <a:ext uri="{28A0092B-C50C-407E-A947-70E740481C1C}">
+                <a14:useLocalDpi xmlns:a14="http://schemas.microsoft.com/office/drawing/2010/main" val="0"/>
+              </a:ext>
+            </a:extLst>
+          </a:blip>
+          <a:srcRect/>
+          <a:stretch>
+            <a:fillRect/>
+          </a:stretch>
+        </p:blipFill>
+        <p:spPr bwMode="auto">
+          <a:xfrm>
+            <a:off x="428743" y="467512"/>
+            <a:ext cx="1673352" cy="356363"/>
+          </a:xfrm>
+          <a:prstGeom prst="rect">
+            <a:avLst/>
+          </a:prstGeom>
+          <a:noFill/>
+          <a:extLst>
+            <a:ext uri="{909E8E84-426E-40DD-AFC4-6F175D3DCCD1}">
+              <a14:hiddenFill xmlns:a14="http://schemas.microsoft.com/office/drawing/2010/main">
+                <a:solidFill>
+                  <a:srgbClr val="FFFFFF"/>
+                </a:solidFill>
+              </a14:hiddenFill>
+            </a:ext>
+          </a:extLst>
+        </p:spPr>
+      </p:pic>
     </p:spTree>
     <p:extLst>
       <p:ext uri="{BB962C8B-B14F-4D97-AF65-F5344CB8AC3E}">
@@ -4035,6 +3685,41 @@
           </p:spPr>
         </p:pic>
       </p:grpSp>
+      <p:pic>
+        <p:nvPicPr>
+          <p:cNvPr id="19" name="Picture 18">
+            <a:extLst>
+              <a:ext uri="{FF2B5EF4-FFF2-40B4-BE49-F238E27FC236}">
+                <a16:creationId xmlns:a16="http://schemas.microsoft.com/office/drawing/2014/main" id="{08B5A76C-581C-40C8-9267-84062AA83DAD}"/>
+              </a:ext>
+            </a:extLst>
+          </p:cNvPr>
+          <p:cNvPicPr>
+            <a:picLocks noChangeAspect="1"/>
+          </p:cNvPicPr>
+          <p:nvPr userDrawn="1"/>
+        </p:nvPicPr>
+        <p:blipFill rotWithShape="1">
+          <a:blip r:embed="rId14" cstate="print">
+            <a:extLst>
+              <a:ext uri="{28A0092B-C50C-407E-A947-70E740481C1C}">
+                <a14:useLocalDpi xmlns:a14="http://schemas.microsoft.com/office/drawing/2010/main" val="0"/>
+              </a:ext>
+            </a:extLst>
+          </a:blip>
+          <a:srcRect l="9719"/>
+          <a:stretch/>
+        </p:blipFill>
+        <p:spPr>
+          <a:xfrm>
+            <a:off x="403508" y="253801"/>
+            <a:ext cx="1932167" cy="787042"/>
+          </a:xfrm>
+          <a:prstGeom prst="rect">
+            <a:avLst/>
+          </a:prstGeom>
+        </p:spPr>
+      </p:pic>
     </p:spTree>
     <p:extLst>
       <p:ext uri="{BB962C8B-B14F-4D97-AF65-F5344CB8AC3E}">

</xml_diff>